<commit_message>
Added more content to slides and a folder to store miscellaneous files (such as formated xlsx tables).
</commit_message>
<xml_diff>
--- a/M6_Seurat_CellType/M5_Seurat_CellType.pptx
+++ b/M6_Seurat_CellType/M5_Seurat_CellType.pptx
@@ -5,11 +5,13 @@
     <p:sldMasterId id="2147483648" r:id="rId1"/>
   </p:sldMasterIdLst>
   <p:notesMasterIdLst>
-    <p:notesMasterId r:id="rId4"/>
+    <p:notesMasterId r:id="rId6"/>
   </p:notesMasterIdLst>
   <p:sldIdLst>
     <p:sldId id="256" r:id="rId2"/>
     <p:sldId id="261" r:id="rId3"/>
+    <p:sldId id="263" r:id="rId4"/>
+    <p:sldId id="262" r:id="rId5"/>
   </p:sldIdLst>
   <p:sldSz cx="12192000" cy="6858000"/>
   <p:notesSz cx="6858000" cy="9144000"/>
@@ -198,7 +200,7 @@
           <a:p>
             <a:fld id="{FF40CFF0-3E11-4AF6-9747-7919C58FBC48}" type="datetimeFigureOut">
               <a:rPr lang="en-US" smtClean="0"/>
-              <a:t>1/3/24</a:t>
+              <a:t>1/4/2024</a:t>
             </a:fld>
             <a:endParaRPr lang="en-US"/>
           </a:p>
@@ -719,7 +721,7 @@
           <a:p>
             <a:fld id="{9F69634C-F75C-45F7-A87A-C5E2AF3ECA41}" type="datetimeFigureOut">
               <a:rPr lang="en-US" smtClean="0"/>
-              <a:t>1/3/24</a:t>
+              <a:t>1/4/2024</a:t>
             </a:fld>
             <a:endParaRPr lang="en-US"/>
           </a:p>
@@ -883,7 +885,7 @@
           <a:p>
             <a:fld id="{9F69634C-F75C-45F7-A87A-C5E2AF3ECA41}" type="datetimeFigureOut">
               <a:rPr lang="en-US" smtClean="0"/>
-              <a:t>1/3/24</a:t>
+              <a:t>1/4/2024</a:t>
             </a:fld>
             <a:endParaRPr lang="en-US"/>
           </a:p>
@@ -1086,7 +1088,7 @@
           <a:p>
             <a:fld id="{9F69634C-F75C-45F7-A87A-C5E2AF3ECA41}" type="datetimeFigureOut">
               <a:rPr lang="en-US" smtClean="0"/>
-              <a:t>1/3/24</a:t>
+              <a:t>1/4/2024</a:t>
             </a:fld>
             <a:endParaRPr lang="en-US"/>
           </a:p>
@@ -1351,7 +1353,7 @@
           <a:p>
             <a:fld id="{9F69634C-F75C-45F7-A87A-C5E2AF3ECA41}" type="datetimeFigureOut">
               <a:rPr lang="en-US" smtClean="0"/>
-              <a:t>1/3/24</a:t>
+              <a:t>1/4/2024</a:t>
             </a:fld>
             <a:endParaRPr lang="en-US"/>
           </a:p>
@@ -1464,7 +1466,7 @@
           <a:p>
             <a:fld id="{9F69634C-F75C-45F7-A87A-C5E2AF3ECA41}" type="datetimeFigureOut">
               <a:rPr lang="en-US" smtClean="0"/>
-              <a:t>1/3/24</a:t>
+              <a:t>1/4/2024</a:t>
             </a:fld>
             <a:endParaRPr lang="en-US"/>
           </a:p>
@@ -1705,7 +1707,7 @@
           <a:p>
             <a:fld id="{9F69634C-F75C-45F7-A87A-C5E2AF3ECA41}" type="datetimeFigureOut">
               <a:rPr lang="en-US" smtClean="0"/>
-              <a:t>1/3/24</a:t>
+              <a:t>1/4/2024</a:t>
             </a:fld>
             <a:endParaRPr lang="en-US"/>
           </a:p>
@@ -1856,14 +1858,14 @@
               <p:nvPr/>
             </p:nvPicPr>
             <p:blipFill rotWithShape="1">
-              <a:blip r:embed="rId7">
+              <a:blip r:embed="rId7" cstate="hqprint">
                 <a:extLst>
                   <a:ext uri="{28A0092B-C50C-407E-A947-70E740481C1C}">
-                    <a14:useLocalDpi xmlns:a14="http://schemas.microsoft.com/office/drawing/2010/main" val="0"/>
+                    <a14:useLocalDpi xmlns:a14="http://schemas.microsoft.com/office/drawing/2010/main"/>
                   </a:ext>
                 </a:extLst>
               </a:blip>
-              <a:srcRect r="92190"/>
+              <a:srcRect/>
               <a:stretch/>
             </p:blipFill>
             <p:spPr bwMode="auto">
@@ -1894,14 +1896,14 @@
               <p:nvPr/>
             </p:nvPicPr>
             <p:blipFill rotWithShape="1">
-              <a:blip r:embed="rId7">
+              <a:blip r:embed="rId8" cstate="hqprint">
                 <a:extLst>
                   <a:ext uri="{28A0092B-C50C-407E-A947-70E740481C1C}">
-                    <a14:useLocalDpi xmlns:a14="http://schemas.microsoft.com/office/drawing/2010/main" val="0"/>
+                    <a14:useLocalDpi xmlns:a14="http://schemas.microsoft.com/office/drawing/2010/main"/>
                   </a:ext>
                 </a:extLst>
               </a:blip>
-              <a:srcRect l="8050" r="48505"/>
+              <a:srcRect/>
               <a:stretch/>
             </p:blipFill>
             <p:spPr bwMode="auto">
@@ -1932,14 +1934,14 @@
               <p:nvPr/>
             </p:nvPicPr>
             <p:blipFill rotWithShape="1">
-              <a:blip r:embed="rId7">
+              <a:blip r:embed="rId9" cstate="hqprint">
                 <a:extLst>
                   <a:ext uri="{28A0092B-C50C-407E-A947-70E740481C1C}">
-                    <a14:useLocalDpi xmlns:a14="http://schemas.microsoft.com/office/drawing/2010/main" val="0"/>
+                    <a14:useLocalDpi xmlns:a14="http://schemas.microsoft.com/office/drawing/2010/main"/>
                   </a:ext>
                 </a:extLst>
               </a:blip>
-              <a:srcRect l="51495"/>
+              <a:srcRect/>
               <a:stretch/>
             </p:blipFill>
             <p:spPr bwMode="auto">
@@ -2075,10 +2077,10 @@
             <p:nvPr/>
           </p:nvPicPr>
           <p:blipFill>
-            <a:blip r:embed="rId8">
+            <a:blip r:embed="rId10" cstate="hqprint">
               <a:extLst>
                 <a:ext uri="{28A0092B-C50C-407E-A947-70E740481C1C}">
-                  <a14:useLocalDpi xmlns:a14="http://schemas.microsoft.com/office/drawing/2010/main" val="0"/>
+                  <a14:useLocalDpi xmlns:a14="http://schemas.microsoft.com/office/drawing/2010/main"/>
                 </a:ext>
               </a:extLst>
             </a:blip>
@@ -2548,10 +2550,498 @@
           </a:p>
         </p:txBody>
       </p:sp>
+      <p:pic>
+        <p:nvPicPr>
+          <p:cNvPr id="1026" name="Picture 2">
+            <a:extLst>
+              <a:ext uri="{FF2B5EF4-FFF2-40B4-BE49-F238E27FC236}">
+                <a16:creationId xmlns:a16="http://schemas.microsoft.com/office/drawing/2014/main" id="{8EAAE515-9CB3-AEF0-B466-C2CC88D478F0}"/>
+              </a:ext>
+            </a:extLst>
+          </p:cNvPr>
+          <p:cNvPicPr>
+            <a:picLocks noChangeAspect="1" noChangeArrowheads="1"/>
+          </p:cNvPicPr>
+          <p:nvPr/>
+        </p:nvPicPr>
+        <p:blipFill>
+          <a:blip r:embed="rId3" cstate="hqprint">
+            <a:extLst>
+              <a:ext uri="{28A0092B-C50C-407E-A947-70E740481C1C}">
+                <a14:useLocalDpi xmlns:a14="http://schemas.microsoft.com/office/drawing/2010/main"/>
+              </a:ext>
+            </a:extLst>
+          </a:blip>
+          <a:srcRect/>
+          <a:stretch>
+            <a:fillRect/>
+          </a:stretch>
+        </p:blipFill>
+        <p:spPr bwMode="auto">
+          <a:xfrm>
+            <a:off x="274320" y="695562"/>
+            <a:ext cx="7118833" cy="6080142"/>
+          </a:xfrm>
+          <a:prstGeom prst="rect">
+            <a:avLst/>
+          </a:prstGeom>
+          <a:noFill/>
+          <a:extLst>
+            <a:ext uri="{909E8E84-426E-40DD-AFC4-6F175D3DCCD1}">
+              <a14:hiddenFill xmlns:a14="http://schemas.microsoft.com/office/drawing/2010/main">
+                <a:solidFill>
+                  <a:srgbClr val="FFFFFF"/>
+                </a:solidFill>
+              </a14:hiddenFill>
+            </a:ext>
+          </a:extLst>
+        </p:spPr>
+      </p:pic>
+      <p:sp>
+        <p:nvSpPr>
+          <p:cNvPr id="4" name="TextBox 3">
+            <a:extLst>
+              <a:ext uri="{FF2B5EF4-FFF2-40B4-BE49-F238E27FC236}">
+                <a16:creationId xmlns:a16="http://schemas.microsoft.com/office/drawing/2014/main" id="{AAAD712B-D70D-1377-6AEE-8C93CF7FB5C6}"/>
+              </a:ext>
+            </a:extLst>
+          </p:cNvPr>
+          <p:cNvSpPr txBox="1"/>
+          <p:nvPr/>
+        </p:nvSpPr>
+        <p:spPr>
+          <a:xfrm>
+            <a:off x="9372600" y="6124694"/>
+            <a:ext cx="2679192" cy="230832"/>
+          </a:xfrm>
+          <a:prstGeom prst="rect">
+            <a:avLst/>
+          </a:prstGeom>
+          <a:noFill/>
+        </p:spPr>
+        <p:txBody>
+          <a:bodyPr wrap="square">
+            <a:spAutoFit/>
+          </a:bodyPr>
+          <a:lstStyle/>
+          <a:p>
+            <a:pPr algn="r"/>
+            <a:r>
+              <a:rPr lang="fr-FR" sz="900" i="1" dirty="0"/>
+              <a:t>Xie. </a:t>
+            </a:r>
+            <a:r>
+              <a:rPr lang="fr-FR" sz="900" i="1" dirty="0" err="1"/>
+              <a:t>Comp</a:t>
+            </a:r>
+            <a:r>
+              <a:rPr lang="fr-FR" sz="900" i="1" dirty="0"/>
+              <a:t>. And </a:t>
+            </a:r>
+            <a:r>
+              <a:rPr lang="fr-FR" sz="900" i="1" dirty="0" err="1"/>
+              <a:t>Str</a:t>
+            </a:r>
+            <a:r>
+              <a:rPr lang="fr-FR" sz="900" i="1" dirty="0"/>
+              <a:t>. Biotech J. (2021). 19: 5874-5887</a:t>
+            </a:r>
+            <a:endParaRPr lang="en-US" sz="900" i="1" dirty="0"/>
+          </a:p>
+        </p:txBody>
+      </p:sp>
+      <p:sp>
+        <p:nvSpPr>
+          <p:cNvPr id="6" name="TextBox 5">
+            <a:extLst>
+              <a:ext uri="{FF2B5EF4-FFF2-40B4-BE49-F238E27FC236}">
+                <a16:creationId xmlns:a16="http://schemas.microsoft.com/office/drawing/2014/main" id="{A492115E-4227-7021-4959-0BEB1D0D01F9}"/>
+              </a:ext>
+            </a:extLst>
+          </p:cNvPr>
+          <p:cNvSpPr txBox="1"/>
+          <p:nvPr/>
+        </p:nvSpPr>
+        <p:spPr>
+          <a:xfrm>
+            <a:off x="7900416" y="2622542"/>
+            <a:ext cx="6199632" cy="369332"/>
+          </a:xfrm>
+          <a:prstGeom prst="rect">
+            <a:avLst/>
+          </a:prstGeom>
+          <a:noFill/>
+        </p:spPr>
+        <p:txBody>
+          <a:bodyPr wrap="square">
+            <a:spAutoFit/>
+          </a:bodyPr>
+          <a:lstStyle/>
+          <a:p>
+            <a:r>
+              <a:rPr lang="en-US" dirty="0"/>
+              <a:t>https://www.nature.com/articles/s41467-022-28803-w</a:t>
+            </a:r>
+          </a:p>
+        </p:txBody>
+      </p:sp>
     </p:spTree>
     <p:extLst>
       <p:ext uri="{BB962C8B-B14F-4D97-AF65-F5344CB8AC3E}">
         <p14:creationId xmlns:p14="http://schemas.microsoft.com/office/powerpoint/2010/main" val="237000122"/>
+      </p:ext>
+    </p:extLst>
+  </p:cSld>
+  <p:clrMapOvr>
+    <a:masterClrMapping/>
+  </p:clrMapOvr>
+</p:sld>
+</file>
+
+<file path=ppt/slides/slide3.xml><?xml version="1.0" encoding="utf-8"?>
+<p:sld xmlns:a="http://schemas.openxmlformats.org/drawingml/2006/main" xmlns:r="http://schemas.openxmlformats.org/officeDocument/2006/relationships" xmlns:p="http://schemas.openxmlformats.org/presentationml/2006/main">
+  <p:cSld>
+    <p:spTree>
+      <p:nvGrpSpPr>
+        <p:cNvPr id="1" name=""/>
+        <p:cNvGrpSpPr/>
+        <p:nvPr/>
+      </p:nvGrpSpPr>
+      <p:grpSpPr>
+        <a:xfrm>
+          <a:off x="0" y="0"/>
+          <a:ext cx="0" cy="0"/>
+          <a:chOff x="0" y="0"/>
+          <a:chExt cx="0" cy="0"/>
+        </a:xfrm>
+      </p:grpSpPr>
+      <p:sp>
+        <p:nvSpPr>
+          <p:cNvPr id="2" name="Title 1">
+            <a:extLst>
+              <a:ext uri="{FF2B5EF4-FFF2-40B4-BE49-F238E27FC236}">
+                <a16:creationId xmlns:a16="http://schemas.microsoft.com/office/drawing/2014/main" id="{DCE24B9F-9985-9B06-0A2B-5D18E6FE8725}"/>
+              </a:ext>
+            </a:extLst>
+          </p:cNvPr>
+          <p:cNvSpPr>
+            <a:spLocks noGrp="1"/>
+          </p:cNvSpPr>
+          <p:nvPr>
+            <p:ph type="title"/>
+          </p:nvPr>
+        </p:nvSpPr>
+        <p:spPr/>
+        <p:txBody>
+          <a:bodyPr/>
+          <a:lstStyle/>
+          <a:p>
+            <a:r>
+              <a:rPr lang="en-US" dirty="0"/>
+              <a:t>Multitude of Packages Available for Cell Type Annotation</a:t>
+            </a:r>
+          </a:p>
+        </p:txBody>
+      </p:sp>
+      <p:pic>
+        <p:nvPicPr>
+          <p:cNvPr id="5" name="Picture 4">
+            <a:extLst>
+              <a:ext uri="{FF2B5EF4-FFF2-40B4-BE49-F238E27FC236}">
+                <a16:creationId xmlns:a16="http://schemas.microsoft.com/office/drawing/2014/main" id="{123C462D-E6E1-594F-477F-DA24D44EFC21}"/>
+              </a:ext>
+            </a:extLst>
+          </p:cNvPr>
+          <p:cNvPicPr>
+            <a:picLocks noChangeAspect="1"/>
+          </p:cNvPicPr>
+          <p:nvPr/>
+        </p:nvPicPr>
+        <p:blipFill>
+          <a:blip r:embed="rId2"/>
+          <a:stretch>
+            <a:fillRect/>
+          </a:stretch>
+        </p:blipFill>
+        <p:spPr>
+          <a:xfrm>
+            <a:off x="185737" y="800671"/>
+            <a:ext cx="6791325" cy="5915025"/>
+          </a:xfrm>
+          <a:prstGeom prst="rect">
+            <a:avLst/>
+          </a:prstGeom>
+        </p:spPr>
+      </p:pic>
+      <p:sp>
+        <p:nvSpPr>
+          <p:cNvPr id="7" name="TextBox 6">
+            <a:extLst>
+              <a:ext uri="{FF2B5EF4-FFF2-40B4-BE49-F238E27FC236}">
+                <a16:creationId xmlns:a16="http://schemas.microsoft.com/office/drawing/2014/main" id="{670AC158-02B7-8D40-5600-BE055BC92744}"/>
+              </a:ext>
+            </a:extLst>
+          </p:cNvPr>
+          <p:cNvSpPr txBox="1"/>
+          <p:nvPr/>
+        </p:nvSpPr>
+        <p:spPr>
+          <a:xfrm>
+            <a:off x="9449717" y="6126956"/>
+            <a:ext cx="2742283" cy="230832"/>
+          </a:xfrm>
+          <a:prstGeom prst="rect">
+            <a:avLst/>
+          </a:prstGeom>
+          <a:noFill/>
+        </p:spPr>
+        <p:txBody>
+          <a:bodyPr wrap="square">
+            <a:spAutoFit/>
+          </a:bodyPr>
+          <a:lstStyle/>
+          <a:p>
+            <a:pPr algn="r"/>
+            <a:r>
+              <a:rPr lang="en-US" sz="900" i="1" dirty="0" err="1"/>
+              <a:t>Pasquini</a:t>
+            </a:r>
+            <a:r>
+              <a:rPr lang="en-US" sz="900" i="1" dirty="0"/>
+              <a:t>. Comp. &amp; Str. Biotech. J. (2021). 19:P961-969.</a:t>
+            </a:r>
+          </a:p>
+        </p:txBody>
+      </p:sp>
+      <p:sp>
+        <p:nvSpPr>
+          <p:cNvPr id="8" name="TextBox 7">
+            <a:extLst>
+              <a:ext uri="{FF2B5EF4-FFF2-40B4-BE49-F238E27FC236}">
+                <a16:creationId xmlns:a16="http://schemas.microsoft.com/office/drawing/2014/main" id="{3900B111-2A85-7E57-3931-941BE78E5176}"/>
+              </a:ext>
+            </a:extLst>
+          </p:cNvPr>
+          <p:cNvSpPr txBox="1"/>
+          <p:nvPr/>
+        </p:nvSpPr>
+        <p:spPr>
+          <a:xfrm>
+            <a:off x="7251649" y="1158134"/>
+            <a:ext cx="4644978" cy="4247317"/>
+          </a:xfrm>
+          <a:prstGeom prst="rect">
+            <a:avLst/>
+          </a:prstGeom>
+          <a:noFill/>
+        </p:spPr>
+        <p:txBody>
+          <a:bodyPr wrap="square" rtlCol="0">
+            <a:spAutoFit/>
+          </a:bodyPr>
+          <a:lstStyle/>
+          <a:p>
+            <a:r>
+              <a:rPr lang="en-US" b="1" dirty="0"/>
+              <a:t>Marker Gene</a:t>
+            </a:r>
+            <a:r>
+              <a:rPr lang="en-US" dirty="0"/>
+              <a:t>: highly expressed genes are identified for each cluster, compare against databases of reference cell type hierarchies and marker lists.</a:t>
+            </a:r>
+          </a:p>
+          <a:p>
+            <a:endParaRPr lang="en-US" dirty="0"/>
+          </a:p>
+          <a:p>
+            <a:endParaRPr lang="en-US" dirty="0"/>
+          </a:p>
+          <a:p>
+            <a:r>
+              <a:rPr lang="en-US" b="1" dirty="0"/>
+              <a:t>Correlation</a:t>
+            </a:r>
+            <a:r>
+              <a:rPr lang="en-US" dirty="0"/>
+              <a:t>: uses correlation measures to compare gene expression profiles to reference dataset, uses “average cell” (centroid) for each cluster as a reference point.</a:t>
+            </a:r>
+          </a:p>
+          <a:p>
+            <a:endParaRPr lang="en-US" dirty="0"/>
+          </a:p>
+          <a:p>
+            <a:endParaRPr lang="en-US" dirty="0"/>
+          </a:p>
+          <a:p>
+            <a:r>
+              <a:rPr lang="en-US" b="1" dirty="0"/>
+              <a:t>Supervised Classification</a:t>
+            </a:r>
+            <a:r>
+              <a:rPr lang="en-US" dirty="0"/>
+              <a:t>: uses machine learning techniques to train a classifier based on reference labeled </a:t>
+            </a:r>
+            <a:r>
+              <a:rPr lang="en-US" dirty="0" err="1"/>
+              <a:t>scRNA</a:t>
+            </a:r>
+            <a:r>
+              <a:rPr lang="en-US" dirty="0"/>
+              <a:t>-Seq datasets.</a:t>
+            </a:r>
+          </a:p>
+        </p:txBody>
+      </p:sp>
+    </p:spTree>
+    <p:extLst>
+      <p:ext uri="{BB962C8B-B14F-4D97-AF65-F5344CB8AC3E}">
+        <p14:creationId xmlns:p14="http://schemas.microsoft.com/office/powerpoint/2010/main" val="2805963317"/>
+      </p:ext>
+    </p:extLst>
+  </p:cSld>
+  <p:clrMapOvr>
+    <a:masterClrMapping/>
+  </p:clrMapOvr>
+</p:sld>
+</file>
+
+<file path=ppt/slides/slide4.xml><?xml version="1.0" encoding="utf-8"?>
+<p:sld xmlns:a="http://schemas.openxmlformats.org/drawingml/2006/main" xmlns:r="http://schemas.openxmlformats.org/officeDocument/2006/relationships" xmlns:p="http://schemas.openxmlformats.org/presentationml/2006/main">
+  <p:cSld>
+    <p:spTree>
+      <p:nvGrpSpPr>
+        <p:cNvPr id="1" name=""/>
+        <p:cNvGrpSpPr/>
+        <p:nvPr/>
+      </p:nvGrpSpPr>
+      <p:grpSpPr>
+        <a:xfrm>
+          <a:off x="0" y="0"/>
+          <a:ext cx="0" cy="0"/>
+          <a:chOff x="0" y="0"/>
+          <a:chExt cx="0" cy="0"/>
+        </a:xfrm>
+      </p:grpSpPr>
+      <p:sp>
+        <p:nvSpPr>
+          <p:cNvPr id="2" name="Title 1">
+            <a:extLst>
+              <a:ext uri="{FF2B5EF4-FFF2-40B4-BE49-F238E27FC236}">
+                <a16:creationId xmlns:a16="http://schemas.microsoft.com/office/drawing/2014/main" id="{ED0C5D33-6C3E-91C9-0986-E01DD15C1EAB}"/>
+              </a:ext>
+            </a:extLst>
+          </p:cNvPr>
+          <p:cNvSpPr>
+            <a:spLocks noGrp="1"/>
+          </p:cNvSpPr>
+          <p:nvPr>
+            <p:ph type="title"/>
+          </p:nvPr>
+        </p:nvSpPr>
+        <p:spPr/>
+        <p:txBody>
+          <a:bodyPr/>
+          <a:lstStyle/>
+          <a:p>
+            <a:endParaRPr lang="en-US"/>
+          </a:p>
+        </p:txBody>
+      </p:sp>
+      <p:pic>
+        <p:nvPicPr>
+          <p:cNvPr id="1026" name="Picture 2" descr="Figure thumbnail gr1">
+            <a:extLst>
+              <a:ext uri="{FF2B5EF4-FFF2-40B4-BE49-F238E27FC236}">
+                <a16:creationId xmlns:a16="http://schemas.microsoft.com/office/drawing/2014/main" id="{7006FC17-FA48-81FC-4678-61ABBB1E338A}"/>
+              </a:ext>
+            </a:extLst>
+          </p:cNvPr>
+          <p:cNvPicPr>
+            <a:picLocks noChangeAspect="1" noChangeArrowheads="1"/>
+          </p:cNvPicPr>
+          <p:nvPr/>
+        </p:nvPicPr>
+        <p:blipFill>
+          <a:blip r:embed="rId2">
+            <a:extLst>
+              <a:ext uri="{28A0092B-C50C-407E-A947-70E740481C1C}">
+                <a14:useLocalDpi xmlns:a14="http://schemas.microsoft.com/office/drawing/2010/main"/>
+              </a:ext>
+            </a:extLst>
+          </a:blip>
+          <a:srcRect/>
+          <a:stretch>
+            <a:fillRect/>
+          </a:stretch>
+        </p:blipFill>
+        <p:spPr bwMode="auto">
+          <a:xfrm>
+            <a:off x="965834" y="859346"/>
+            <a:ext cx="6715125" cy="4751706"/>
+          </a:xfrm>
+          <a:prstGeom prst="rect">
+            <a:avLst/>
+          </a:prstGeom>
+          <a:noFill/>
+          <a:extLst>
+            <a:ext uri="{909E8E84-426E-40DD-AFC4-6F175D3DCCD1}">
+              <a14:hiddenFill xmlns:a14="http://schemas.microsoft.com/office/drawing/2010/main">
+                <a:solidFill>
+                  <a:srgbClr val="FFFFFF"/>
+                </a:solidFill>
+              </a14:hiddenFill>
+            </a:ext>
+          </a:extLst>
+        </p:spPr>
+      </p:pic>
+      <p:sp>
+        <p:nvSpPr>
+          <p:cNvPr id="4" name="TextBox 3">
+            <a:extLst>
+              <a:ext uri="{FF2B5EF4-FFF2-40B4-BE49-F238E27FC236}">
+                <a16:creationId xmlns:a16="http://schemas.microsoft.com/office/drawing/2014/main" id="{20557737-3B72-0ED7-B7C1-6068D7419E33}"/>
+              </a:ext>
+            </a:extLst>
+          </p:cNvPr>
+          <p:cNvSpPr txBox="1"/>
+          <p:nvPr/>
+        </p:nvSpPr>
+        <p:spPr>
+          <a:xfrm>
+            <a:off x="7013448" y="6627168"/>
+            <a:ext cx="2834640" cy="230832"/>
+          </a:xfrm>
+          <a:prstGeom prst="rect">
+            <a:avLst/>
+          </a:prstGeom>
+          <a:noFill/>
+        </p:spPr>
+        <p:txBody>
+          <a:bodyPr wrap="square">
+            <a:spAutoFit/>
+          </a:bodyPr>
+          <a:lstStyle/>
+          <a:p>
+            <a:pPr algn="r"/>
+            <a:r>
+              <a:rPr lang="en-US" sz="900" i="1" dirty="0"/>
+              <a:t> </a:t>
+            </a:r>
+            <a:r>
+              <a:rPr lang="en-US" sz="900" i="1" dirty="0" err="1"/>
+              <a:t>Pasquini</a:t>
+            </a:r>
+            <a:r>
+              <a:rPr lang="en-US" sz="900" i="1" dirty="0"/>
+              <a:t>. Comp. and Str. Biotech. J. (2021). 19:961-969.</a:t>
+            </a:r>
+          </a:p>
+        </p:txBody>
+      </p:sp>
+    </p:spTree>
+    <p:extLst>
+      <p:ext uri="{BB962C8B-B14F-4D97-AF65-F5344CB8AC3E}">
+        <p14:creationId xmlns:p14="http://schemas.microsoft.com/office/powerpoint/2010/main" val="2790086309"/>
       </p:ext>
     </p:extLst>
   </p:cSld>

</xml_diff>